<commit_message>
Changes of Order Processing for LOC and SD
</commit_message>
<xml_diff>
--- a/NetAgent/src/main/resources/AgentActivityChart.pptx
+++ b/NetAgent/src/main/resources/AgentActivityChart.pptx
@@ -440,7 +440,7 @@
                 </a:solidFill>
                 <a:latin typeface="Arial"/>
               </a:rPr>
-              <a:t>6/21/2022 12:42 AM</a:t>
+              <a:t>6/23/2022 10:51 PM</a:t>
             </a:r>
           </a:p>
         </p:txBody>
@@ -610,7 +610,7 @@
                 </a:solidFill>
                 <a:latin typeface="Arial"/>
               </a:rPr>
-              <a:t>6/21/2022 12:42 AM</a:t>
+              <a:t>6/23/2022 10:51 PM</a:t>
             </a:r>
           </a:p>
         </p:txBody>
@@ -753,7 +753,7 @@
                 </a:solidFill>
                 <a:latin typeface="Arial"/>
               </a:rPr>
-              <a:t>6/21/2022 12:42 AM</a:t>
+              <a:t>6/23/2022 10:51 PM</a:t>
             </a:r>
           </a:p>
         </p:txBody>

</xml_diff>